<commit_message>
adding temporary press files for week 2
</commit_message>
<xml_diff>
--- a/presentation_files/week2_Quantum_Reservoir_Computing.pptx
+++ b/presentation_files/week2_Quantum_Reservoir_Computing.pptx
@@ -5,10 +5,10 @@
     <p:sldMasterId id="2147483669" r:id="rId4"/>
   </p:sldMasterIdLst>
   <p:notesMasterIdLst>
-    <p:notesMasterId r:id="rId17"/>
+    <p:notesMasterId r:id="rId18"/>
   </p:notesMasterIdLst>
   <p:handoutMasterIdLst>
-    <p:handoutMasterId r:id="rId18"/>
+    <p:handoutMasterId r:id="rId19"/>
   </p:handoutMasterIdLst>
   <p:sldIdLst>
     <p:sldId id="256" r:id="rId5"/>
@@ -23,6 +23,7 @@
     <p:sldId id="263" r:id="rId14"/>
     <p:sldId id="267" r:id="rId15"/>
     <p:sldId id="268" r:id="rId16"/>
+    <p:sldId id="269" r:id="rId17"/>
   </p:sldIdLst>
   <p:sldSz cx="12192000" cy="6858000"/>
   <p:notesSz cx="6858000" cy="9144000"/>
@@ -13978,6 +13979,358 @@
 </p:sld>
 </file>
 
+<file path=ppt/slides/slide13.xml><?xml version="1.0" encoding="utf-8"?>
+<p:sld xmlns:a="http://schemas.openxmlformats.org/drawingml/2006/main" xmlns:r="http://schemas.openxmlformats.org/officeDocument/2006/relationships" xmlns:p="http://schemas.openxmlformats.org/presentationml/2006/main">
+  <p:cSld>
+    <p:spTree>
+      <p:nvGrpSpPr>
+        <p:cNvPr id="1" name=""/>
+        <p:cNvGrpSpPr/>
+        <p:nvPr/>
+      </p:nvGrpSpPr>
+      <p:grpSpPr>
+        <a:xfrm>
+          <a:off x="0" y="0"/>
+          <a:ext cx="0" cy="0"/>
+          <a:chOff x="0" y="0"/>
+          <a:chExt cx="0" cy="0"/>
+        </a:xfrm>
+      </p:grpSpPr>
+      <p:sp>
+        <p:nvSpPr>
+          <p:cNvPr id="2" name="Title 1">
+            <a:extLst>
+              <a:ext uri="{FF2B5EF4-FFF2-40B4-BE49-F238E27FC236}">
+                <a16:creationId xmlns:a16="http://schemas.microsoft.com/office/drawing/2014/main" id="{2B930A2A-FB11-2788-CBF1-8F9DDE37DB02}"/>
+              </a:ext>
+            </a:extLst>
+          </p:cNvPr>
+          <p:cNvSpPr>
+            <a:spLocks noGrp="1"/>
+          </p:cNvSpPr>
+          <p:nvPr>
+            <p:ph type="title"/>
+          </p:nvPr>
+        </p:nvSpPr>
+        <p:spPr/>
+        <p:txBody>
+          <a:bodyPr/>
+          <a:lstStyle/>
+          <a:p>
+            <a:r>
+              <a:rPr lang="en-US" dirty="0"/>
+              <a:t>Bibliography </a:t>
+            </a:r>
+            <a:br>
+              <a:rPr lang="en-US" dirty="0"/>
+            </a:br>
+            <a:endParaRPr lang="en-US" dirty="0"/>
+          </a:p>
+        </p:txBody>
+      </p:sp>
+      <p:sp>
+        <p:nvSpPr>
+          <p:cNvPr id="3" name="Content Placeholder 2">
+            <a:extLst>
+              <a:ext uri="{FF2B5EF4-FFF2-40B4-BE49-F238E27FC236}">
+                <a16:creationId xmlns:a16="http://schemas.microsoft.com/office/drawing/2014/main" id="{E6E35AAF-4BE5-A623-A125-EB5EACB34A14}"/>
+              </a:ext>
+            </a:extLst>
+          </p:cNvPr>
+          <p:cNvSpPr>
+            <a:spLocks noGrp="1"/>
+          </p:cNvSpPr>
+          <p:nvPr>
+            <p:ph idx="1"/>
+          </p:nvPr>
+        </p:nvSpPr>
+        <p:spPr/>
+        <p:txBody>
+          <a:bodyPr>
+            <a:normAutofit fontScale="85000" lnSpcReduction="20000"/>
+          </a:bodyPr>
+          <a:lstStyle/>
+          <a:p>
+            <a:r>
+              <a:rPr lang="en-US" dirty="0">
+                <a:hlinkClick r:id="rId2"/>
+              </a:rPr>
+              <a:t>https://www.ibm.com/topics/recurrent-neural-networks</a:t>
+            </a:r>
+            <a:endParaRPr lang="en-US" dirty="0"/>
+          </a:p>
+          <a:p>
+            <a:r>
+              <a:rPr lang="en-US" dirty="0">
+                <a:hlinkClick r:id="rId3"/>
+              </a:rPr>
+              <a:t>https://en.wikipedia.org/wiki/Reservoir_computing</a:t>
+            </a:r>
+            <a:endParaRPr lang="en-US" dirty="0"/>
+          </a:p>
+          <a:p>
+            <a:r>
+              <a:rPr lang="en-US" dirty="0">
+                <a:hlinkClick r:id="rId4"/>
+              </a:rPr>
+              <a:t>https://en.wikipedia.org/wiki/Recurrent_neural_network</a:t>
+            </a:r>
+            <a:endParaRPr lang="en-US" dirty="0"/>
+          </a:p>
+          <a:p>
+            <a:r>
+              <a:rPr lang="en-US" dirty="0"/>
+              <a:t>Some papers that helped me understand just a little more:</a:t>
+            </a:r>
+          </a:p>
+          <a:p>
+            <a:r>
+              <a:rPr lang="en-US" b="0" i="0" dirty="0">
+                <a:solidFill>
+                  <a:srgbClr val="222222"/>
+                </a:solidFill>
+                <a:effectLst/>
+                <a:latin typeface="-apple-system"/>
+              </a:rPr>
+              <a:t>Gauthier, D.J., </a:t>
+            </a:r>
+            <a:r>
+              <a:rPr lang="en-US" b="0" i="0" dirty="0" err="1">
+                <a:solidFill>
+                  <a:srgbClr val="222222"/>
+                </a:solidFill>
+                <a:effectLst/>
+                <a:latin typeface="-apple-system"/>
+              </a:rPr>
+              <a:t>Bollt</a:t>
+            </a:r>
+            <a:r>
+              <a:rPr lang="en-US" b="0" i="0" dirty="0">
+                <a:solidFill>
+                  <a:srgbClr val="222222"/>
+                </a:solidFill>
+                <a:effectLst/>
+                <a:latin typeface="-apple-system"/>
+              </a:rPr>
+              <a:t>, E., Griffith, A. </a:t>
+            </a:r>
+            <a:r>
+              <a:rPr lang="en-US" b="0" i="1" dirty="0">
+                <a:solidFill>
+                  <a:srgbClr val="222222"/>
+                </a:solidFill>
+                <a:effectLst/>
+                <a:latin typeface="-apple-system"/>
+              </a:rPr>
+              <a:t>et al.</a:t>
+            </a:r>
+            <a:r>
+              <a:rPr lang="en-US" b="0" i="0" dirty="0">
+                <a:solidFill>
+                  <a:srgbClr val="222222"/>
+                </a:solidFill>
+                <a:effectLst/>
+                <a:latin typeface="-apple-system"/>
+              </a:rPr>
+              <a:t> Next generation reservoir computing. </a:t>
+            </a:r>
+            <a:r>
+              <a:rPr lang="en-US" b="0" i="1" dirty="0">
+                <a:solidFill>
+                  <a:srgbClr val="222222"/>
+                </a:solidFill>
+                <a:effectLst/>
+                <a:latin typeface="-apple-system"/>
+              </a:rPr>
+              <a:t>Nat </a:t>
+            </a:r>
+            <a:r>
+              <a:rPr lang="en-US" b="0" i="1" dirty="0" err="1">
+                <a:solidFill>
+                  <a:srgbClr val="222222"/>
+                </a:solidFill>
+                <a:effectLst/>
+                <a:latin typeface="-apple-system"/>
+              </a:rPr>
+              <a:t>Commun</a:t>
+            </a:r>
+            <a:r>
+              <a:rPr lang="en-US" b="0" i="0" dirty="0">
+                <a:solidFill>
+                  <a:srgbClr val="222222"/>
+                </a:solidFill>
+                <a:effectLst/>
+                <a:latin typeface="-apple-system"/>
+              </a:rPr>
+              <a:t> </a:t>
+            </a:r>
+            <a:r>
+              <a:rPr lang="en-US" b="1" i="0" dirty="0">
+                <a:solidFill>
+                  <a:srgbClr val="222222"/>
+                </a:solidFill>
+                <a:effectLst/>
+                <a:latin typeface="-apple-system"/>
+              </a:rPr>
+              <a:t>12</a:t>
+            </a:r>
+            <a:r>
+              <a:rPr lang="en-US" b="0" i="0" dirty="0">
+                <a:solidFill>
+                  <a:srgbClr val="222222"/>
+                </a:solidFill>
+                <a:effectLst/>
+                <a:latin typeface="-apple-system"/>
+              </a:rPr>
+              <a:t>, 5564 (2021). </a:t>
+            </a:r>
+            <a:r>
+              <a:rPr lang="en-US" b="0" i="0" dirty="0">
+                <a:solidFill>
+                  <a:srgbClr val="222222"/>
+                </a:solidFill>
+                <a:effectLst/>
+                <a:latin typeface="-apple-system"/>
+                <a:hlinkClick r:id="rId5"/>
+              </a:rPr>
+              <a:t>https://doi.org/10.1038/s41467-021-25801-2</a:t>
+            </a:r>
+            <a:endParaRPr lang="en-US" b="0" i="0" dirty="0">
+              <a:solidFill>
+                <a:srgbClr val="222222"/>
+              </a:solidFill>
+              <a:effectLst/>
+              <a:latin typeface="-apple-system"/>
+            </a:endParaRPr>
+          </a:p>
+          <a:p>
+            <a:r>
+              <a:rPr lang="en-US" b="0" i="0" dirty="0">
+                <a:solidFill>
+                  <a:srgbClr val="222222"/>
+                </a:solidFill>
+                <a:effectLst/>
+                <a:latin typeface="-apple-system"/>
+              </a:rPr>
+              <a:t>Suzuki, Y., Gao, Q., </a:t>
+            </a:r>
+            <a:r>
+              <a:rPr lang="en-US" b="0" i="0" dirty="0" err="1">
+                <a:solidFill>
+                  <a:srgbClr val="222222"/>
+                </a:solidFill>
+                <a:effectLst/>
+                <a:latin typeface="-apple-system"/>
+              </a:rPr>
+              <a:t>Pradel</a:t>
+            </a:r>
+            <a:r>
+              <a:rPr lang="en-US" b="0" i="0" dirty="0">
+                <a:solidFill>
+                  <a:srgbClr val="222222"/>
+                </a:solidFill>
+                <a:effectLst/>
+                <a:latin typeface="-apple-system"/>
+              </a:rPr>
+              <a:t>, K.C. </a:t>
+            </a:r>
+            <a:r>
+              <a:rPr lang="en-US" b="0" i="1" dirty="0">
+                <a:solidFill>
+                  <a:srgbClr val="222222"/>
+                </a:solidFill>
+                <a:effectLst/>
+                <a:latin typeface="-apple-system"/>
+              </a:rPr>
+              <a:t>et al.</a:t>
+            </a:r>
+            <a:r>
+              <a:rPr lang="en-US" b="0" i="0" dirty="0">
+                <a:solidFill>
+                  <a:srgbClr val="222222"/>
+                </a:solidFill>
+                <a:effectLst/>
+                <a:latin typeface="-apple-system"/>
+              </a:rPr>
+              <a:t> Natural quantum reservoir computing for temporal information processing. </a:t>
+            </a:r>
+            <a:r>
+              <a:rPr lang="en-US" b="0" i="1" dirty="0">
+                <a:solidFill>
+                  <a:srgbClr val="222222"/>
+                </a:solidFill>
+                <a:effectLst/>
+                <a:latin typeface="-apple-system"/>
+              </a:rPr>
+              <a:t>Sci Rep</a:t>
+            </a:r>
+            <a:r>
+              <a:rPr lang="en-US" b="0" i="0" dirty="0">
+                <a:solidFill>
+                  <a:srgbClr val="222222"/>
+                </a:solidFill>
+                <a:effectLst/>
+                <a:latin typeface="-apple-system"/>
+              </a:rPr>
+              <a:t> </a:t>
+            </a:r>
+            <a:r>
+              <a:rPr lang="en-US" b="1" i="0" dirty="0">
+                <a:solidFill>
+                  <a:srgbClr val="222222"/>
+                </a:solidFill>
+                <a:effectLst/>
+                <a:latin typeface="-apple-system"/>
+              </a:rPr>
+              <a:t>12</a:t>
+            </a:r>
+            <a:r>
+              <a:rPr lang="en-US" b="0" i="0" dirty="0">
+                <a:solidFill>
+                  <a:srgbClr val="222222"/>
+                </a:solidFill>
+                <a:effectLst/>
+                <a:latin typeface="-apple-system"/>
+              </a:rPr>
+              <a:t>, 1353 (2022). </a:t>
+            </a:r>
+            <a:r>
+              <a:rPr lang="en-US" b="0" i="0" dirty="0">
+                <a:solidFill>
+                  <a:srgbClr val="222222"/>
+                </a:solidFill>
+                <a:effectLst/>
+                <a:latin typeface="-apple-system"/>
+                <a:hlinkClick r:id="rId6"/>
+              </a:rPr>
+              <a:t>https://doi.org/10.1038/s41598-022-05061-w</a:t>
+            </a:r>
+            <a:endParaRPr lang="en-US" b="0" i="0" dirty="0">
+              <a:solidFill>
+                <a:srgbClr val="222222"/>
+              </a:solidFill>
+              <a:effectLst/>
+              <a:latin typeface="-apple-system"/>
+            </a:endParaRPr>
+          </a:p>
+          <a:p>
+            <a:endParaRPr lang="en-US" dirty="0"/>
+          </a:p>
+        </p:txBody>
+      </p:sp>
+    </p:spTree>
+    <p:extLst>
+      <p:ext uri="{BB962C8B-B14F-4D97-AF65-F5344CB8AC3E}">
+        <p14:creationId xmlns:p14="http://schemas.microsoft.com/office/powerpoint/2010/main" val="246482378"/>
+      </p:ext>
+    </p:extLst>
+  </p:cSld>
+  <p:clrMapOvr>
+    <a:masterClrMapping/>
+  </p:clrMapOvr>
+</p:sld>
+</file>
+
 <file path=ppt/slides/slide2.xml><?xml version="1.0" encoding="utf-8"?>
 <p:sld xmlns:a="http://schemas.openxmlformats.org/drawingml/2006/main" xmlns:r="http://schemas.openxmlformats.org/officeDocument/2006/relationships" xmlns:p="http://schemas.openxmlformats.org/presentationml/2006/main">
   <p:cSld>

</xml_diff>